<commit_message>
Update names, date and schedule on slides.
</commit_message>
<xml_diff>
--- a/Slides/QLS-MiCM_IntroToPython.pptx
+++ b/Slides/QLS-MiCM_IntroToPython.pptx
@@ -223,7 +223,7 @@
           <a:p>
             <a:fld id="{9FF74AA5-8A3E-4FDB-94BB-BF4B31CB4E38}" type="datetimeFigureOut">
               <a:rPr lang="en-CA" smtClean="0"/>
-              <a:t>2025-11-09</a:t>
+              <a:t>2026-02-06</a:t>
             </a:fld>
             <a:endParaRPr lang="en-CA"/>
           </a:p>
@@ -400,7 +400,7 @@
           <a:p>
             <a:fld id="{217E5156-1B5D-054E-B5B2-E1B1BA160252}" type="datetimeFigureOut">
               <a:rPr lang="fr-FR" smtClean="0"/>
-              <a:t>09/11/2025</a:t>
+              <a:t>06/02/2026</a:t>
             </a:fld>
             <a:endParaRPr lang="fr-FR"/>
           </a:p>
@@ -3163,8 +3163,8 @@
         </p:nvSpPr>
         <p:spPr>
           <a:xfrm>
-            <a:off x="80296" y="6075446"/>
-            <a:ext cx="3567878" cy="646331"/>
+            <a:off x="80296" y="5613781"/>
+            <a:ext cx="3567878" cy="923330"/>
           </a:xfrm>
           <a:prstGeom prst="rect">
             <a:avLst/>
@@ -3181,7 +3181,7 @@
               <a:rPr lang="en-CA" sz="1800" dirty="0">
                 <a:latin typeface="Helvetica Light"/>
               </a:rPr>
-              <a:t>Benjamin Z. Rudski</a:t>
+              <a:t>Lead: Benjamin Z. Rudski</a:t>
             </a:r>
           </a:p>
           <a:p>
@@ -3189,7 +3189,15 @@
               <a:rPr lang="en-CA" sz="1800" dirty="0">
                 <a:latin typeface="Helvetica Light"/>
               </a:rPr>
-              <a:t>November 13, 2025</a:t>
+              <a:t>Facilitator: Sameena Karsan</a:t>
+            </a:r>
+          </a:p>
+          <a:p>
+            <a:r>
+              <a:rPr lang="en-CA" sz="1800" dirty="0">
+                <a:latin typeface="Helvetica Light"/>
+              </a:rPr>
+              <a:t>February 11, 2026</a:t>
             </a:r>
             <a:endParaRPr lang="en-CA" dirty="0">
               <a:latin typeface="Helvetica Light"/>
@@ -3707,10 +3715,10 @@
       </p:sp>
       <p:pic>
         <p:nvPicPr>
-          <p:cNvPr id="3" name="Picture 2">
+          <p:cNvPr id="2" name="Picture 1">
             <a:extLst>
               <a:ext uri="{FF2B5EF4-FFF2-40B4-BE49-F238E27FC236}">
-                <a16:creationId xmlns:a16="http://schemas.microsoft.com/office/drawing/2014/main" id="{B7DF5B93-5AD7-48E9-BD8D-CD406B453297}"/>
+                <a16:creationId xmlns:a16="http://schemas.microsoft.com/office/drawing/2014/main" id="{6C69662F-A1C2-FE8A-835A-B5EA24525124}"/>
               </a:ext>
             </a:extLst>
           </p:cNvPr>
@@ -3721,69 +3729,20 @@
         </p:nvPicPr>
         <p:blipFill>
           <a:blip r:embed="rId4"/>
-          <a:srcRect b="24034"/>
           <a:stretch>
             <a:fillRect/>
           </a:stretch>
         </p:blipFill>
         <p:spPr>
           <a:xfrm>
-            <a:off x="685800" y="2094448"/>
-            <a:ext cx="7772400" cy="3009583"/>
+            <a:off x="685800" y="2386087"/>
+            <a:ext cx="7772400" cy="2426304"/>
           </a:xfrm>
           <a:prstGeom prst="rect">
             <a:avLst/>
           </a:prstGeom>
         </p:spPr>
       </p:pic>
-      <p:sp>
-        <p:nvSpPr>
-          <p:cNvPr id="6" name="TextBox 5">
-            <a:extLst>
-              <a:ext uri="{FF2B5EF4-FFF2-40B4-BE49-F238E27FC236}">
-                <a16:creationId xmlns:a16="http://schemas.microsoft.com/office/drawing/2014/main" id="{082F5C12-37BB-8296-44E4-3A894081D3AD}"/>
-              </a:ext>
-            </a:extLst>
-          </p:cNvPr>
-          <p:cNvSpPr txBox="1"/>
-          <p:nvPr/>
-        </p:nvSpPr>
-        <p:spPr>
-          <a:xfrm>
-            <a:off x="1868520" y="5626007"/>
-            <a:ext cx="5406960" cy="369460"/>
-          </a:xfrm>
-          <a:prstGeom prst="rect">
-            <a:avLst/>
-          </a:prstGeom>
-          <a:noFill/>
-        </p:spPr>
-        <p:txBody>
-          <a:bodyPr wrap="square">
-            <a:spAutoFit/>
-          </a:bodyPr>
-          <a:lstStyle>
-            <a:defPPr>
-              <a:defRPr lang="fr-FR"/>
-            </a:defPPr>
-            <a:lvl1pPr>
-              <a:defRPr>
-                <a:latin typeface="Helvetica" pitchFamily="2" charset="0"/>
-              </a:defRPr>
-            </a:lvl1pPr>
-          </a:lstStyle>
-          <a:p>
-            <a:pPr algn="ctr"/>
-            <a:r>
-              <a:rPr lang="en-CA" dirty="0">
-                <a:hlinkClick r:id="rId5"/>
-              </a:rPr>
-              <a:t>https://involvement.mcgill.ca/organization/micm</a:t>
-            </a:r>
-            <a:endParaRPr lang="en-CA" dirty="0"/>
-          </a:p>
-        </p:txBody>
-      </p:sp>
     </p:spTree>
     <p:extLst>
       <p:ext uri="{BB962C8B-B14F-4D97-AF65-F5344CB8AC3E}">

</xml_diff>